<commit_message>
Added a big picture image
</commit_message>
<xml_diff>
--- a/docs/HacknightPowerPoint.pptx
+++ b/docs/HacknightPowerPoint.pptx
@@ -110,7 +110,7 @@
   </p:defaultTextStyle>
   <p:extLst>
     <p:ext uri="{EFAFB233-063F-42B5-8137-9DF3F51BA10A}">
-      <p15:sldGuideLst xmlns:p15="http://schemas.microsoft.com/office/powerpoint/2012/main">
+      <p15:sldGuideLst xmlns:p15="http://schemas.microsoft.com/office/powerpoint/2012/main" xmlns="">
         <p15:guide id="1" orient="horz" pos="2160">
           <p15:clr>
             <a:srgbClr val="A4A3A4"/>
@@ -316,7 +316,7 @@
           <a:p>
             <a:fld id="{9CEFAD04-0E20-4919-AC81-0484DA486390}" type="datetimeFigureOut">
               <a:rPr lang="en-US" smtClean="0"/>
-              <a:t>11/24/2012</a:t>
+              <a:t>11/26/2012</a:t>
             </a:fld>
             <a:endParaRPr lang="en-US"/>
           </a:p>
@@ -493,7 +493,7 @@
           <a:p>
             <a:fld id="{9CEFAD04-0E20-4919-AC81-0484DA486390}" type="datetimeFigureOut">
               <a:rPr lang="en-US" smtClean="0"/>
-              <a:t>11/24/2012</a:t>
+              <a:t>11/26/2012</a:t>
             </a:fld>
             <a:endParaRPr lang="en-US"/>
           </a:p>
@@ -691,7 +691,7 @@
           <a:p>
             <a:fld id="{9CEFAD04-0E20-4919-AC81-0484DA486390}" type="datetimeFigureOut">
               <a:rPr lang="en-US" smtClean="0"/>
-              <a:t>11/24/2012</a:t>
+              <a:t>11/26/2012</a:t>
             </a:fld>
             <a:endParaRPr lang="en-US"/>
           </a:p>
@@ -845,7 +845,7 @@
           <a:p>
             <a:fld id="{9CEFAD04-0E20-4919-AC81-0484DA486390}" type="datetimeFigureOut">
               <a:rPr lang="en-US" smtClean="0"/>
-              <a:t>11/24/2012</a:t>
+              <a:t>11/26/2012</a:t>
             </a:fld>
             <a:endParaRPr lang="en-US"/>
           </a:p>
@@ -1120,7 +1120,7 @@
           <a:p>
             <a:fld id="{9CEFAD04-0E20-4919-AC81-0484DA486390}" type="datetimeFigureOut">
               <a:rPr lang="en-US" smtClean="0"/>
-              <a:t>11/24/2012</a:t>
+              <a:t>11/26/2012</a:t>
             </a:fld>
             <a:endParaRPr lang="en-US"/>
           </a:p>
@@ -1419,7 +1419,7 @@
           <a:p>
             <a:fld id="{9CEFAD04-0E20-4919-AC81-0484DA486390}" type="datetimeFigureOut">
               <a:rPr lang="en-US" smtClean="0"/>
-              <a:t>11/24/2012</a:t>
+              <a:t>11/26/2012</a:t>
             </a:fld>
             <a:endParaRPr lang="en-US"/>
           </a:p>
@@ -1861,7 +1861,7 @@
           <a:p>
             <a:fld id="{9CEFAD04-0E20-4919-AC81-0484DA486390}" type="datetimeFigureOut">
               <a:rPr lang="en-US" smtClean="0"/>
-              <a:t>11/24/2012</a:t>
+              <a:t>11/26/2012</a:t>
             </a:fld>
             <a:endParaRPr lang="en-US"/>
           </a:p>
@@ -1968,7 +1968,7 @@
           <a:p>
             <a:fld id="{9CEFAD04-0E20-4919-AC81-0484DA486390}" type="datetimeFigureOut">
               <a:rPr lang="en-US" smtClean="0"/>
-              <a:t>11/24/2012</a:t>
+              <a:t>11/26/2012</a:t>
             </a:fld>
             <a:endParaRPr lang="en-US"/>
           </a:p>
@@ -2088,7 +2088,7 @@
           <a:p>
             <a:fld id="{9CEFAD04-0E20-4919-AC81-0484DA486390}" type="datetimeFigureOut">
               <a:rPr lang="en-US" smtClean="0"/>
-              <a:t>11/24/2012</a:t>
+              <a:t>11/26/2012</a:t>
             </a:fld>
             <a:endParaRPr lang="en-US"/>
           </a:p>
@@ -2373,7 +2373,7 @@
           <a:p>
             <a:fld id="{9CEFAD04-0E20-4919-AC81-0484DA486390}" type="datetimeFigureOut">
               <a:rPr lang="en-US" smtClean="0"/>
-              <a:t>11/24/2012</a:t>
+              <a:t>11/26/2012</a:t>
             </a:fld>
             <a:endParaRPr lang="en-US"/>
           </a:p>
@@ -2644,7 +2644,7 @@
           <a:p>
             <a:fld id="{9CEFAD04-0E20-4919-AC81-0484DA486390}" type="datetimeFigureOut">
               <a:rPr lang="en-US" smtClean="0"/>
-              <a:t>11/24/2012</a:t>
+              <a:t>11/26/2012</a:t>
             </a:fld>
             <a:endParaRPr lang="en-US"/>
           </a:p>
@@ -2864,7 +2864,7 @@
           <a:p>
             <a:fld id="{9CEFAD04-0E20-4919-AC81-0484DA486390}" type="datetimeFigureOut">
               <a:rPr lang="en-US" smtClean="0"/>
-              <a:t>11/24/2012</a:t>
+              <a:t>11/26/2012</a:t>
             </a:fld>
             <a:endParaRPr lang="en-US"/>
           </a:p>
@@ -4874,7 +4874,7 @@
                     <a:bodyPr/>
                     <a:lstStyle/>
                     <a:p>
-                      <a:endParaRPr lang="en-US"/>
+                      <a:endParaRPr lang="en-US" dirty="0"/>
                     </a:p>
                   </a:txBody>
                   <a:tcPr/>
@@ -7464,169 +7464,66 @@
       </p:grpSp>
       <p:grpSp>
         <p:nvGrpSpPr>
-          <p:cNvPr id="2099" name="Group 2098"/>
+          <p:cNvPr id="2093" name="Group 2092"/>
           <p:cNvGrpSpPr/>
           <p:nvPr/>
         </p:nvGrpSpPr>
         <p:grpSpPr>
           <a:xfrm>
-            <a:off x="5250229" y="77163"/>
-            <a:ext cx="3801862" cy="3310905"/>
+            <a:off x="4794670" y="109193"/>
+            <a:ext cx="4251491" cy="3124200"/>
             <a:chOff x="5250229" y="77163"/>
-            <a:chExt cx="3801862" cy="3310905"/>
+            <a:chExt cx="3801862" cy="3124200"/>
           </a:xfrm>
         </p:grpSpPr>
-        <p:grpSp>
-          <p:nvGrpSpPr>
-            <p:cNvPr id="2093" name="Group 2092"/>
-            <p:cNvGrpSpPr/>
-            <p:nvPr/>
-          </p:nvGrpSpPr>
-          <p:grpSpPr>
-            <a:xfrm>
-              <a:off x="5250229" y="77163"/>
-              <a:ext cx="3801862" cy="3124200"/>
-              <a:chOff x="5250229" y="77163"/>
-              <a:chExt cx="3801862" cy="3124200"/>
-            </a:xfrm>
-          </p:grpSpPr>
-          <p:sp>
-            <p:nvSpPr>
-              <p:cNvPr id="19" name="Cloud Callout 18"/>
-              <p:cNvSpPr/>
-              <p:nvPr/>
-            </p:nvSpPr>
-            <p:spPr>
-              <a:xfrm>
-                <a:off x="5250229" y="77163"/>
-                <a:ext cx="3801862" cy="3124200"/>
-              </a:xfrm>
-              <a:prstGeom prst="cloudCallout">
-                <a:avLst>
-                  <a:gd name="adj1" fmla="val -72090"/>
-                  <a:gd name="adj2" fmla="val 54111"/>
-                </a:avLst>
-              </a:prstGeom>
-              <a:ln>
-                <a:solidFill>
-                  <a:schemeClr val="bg1"/>
-                </a:solidFill>
-              </a:ln>
-              <a:effectLst>
-                <a:glow rad="101600">
-                  <a:schemeClr val="accent3">
-                    <a:satMod val="175000"/>
-                    <a:alpha val="40000"/>
-                  </a:schemeClr>
-                </a:glow>
-                <a:outerShdw blurRad="50800" dist="25400" dir="5400000" rotWithShape="0">
-                  <a:srgbClr val="000000">
-                    <a:alpha val="55000"/>
-                  </a:srgbClr>
-                </a:outerShdw>
-              </a:effectLst>
-            </p:spPr>
-            <p:style>
-              <a:lnRef idx="1">
-                <a:schemeClr val="accent1"/>
-              </a:lnRef>
-              <a:fillRef idx="2">
-                <a:schemeClr val="accent1"/>
-              </a:fillRef>
-              <a:effectRef idx="1">
-                <a:schemeClr val="accent1"/>
-              </a:effectRef>
-              <a:fontRef idx="minor">
-                <a:schemeClr val="dk1"/>
-              </a:fontRef>
-            </p:style>
-            <p:txBody>
-              <a:bodyPr rtlCol="0" anchor="ctr"/>
-              <a:lstStyle/>
-              <a:p>
-                <a:pPr algn="ctr"/>
-                <a:endParaRPr lang="en-US"/>
-              </a:p>
-            </p:txBody>
-          </p:sp>
-          <p:sp>
-            <p:nvSpPr>
-              <p:cNvPr id="2048" name="TextBox 2047"/>
-              <p:cNvSpPr txBox="1"/>
-              <p:nvPr/>
-            </p:nvSpPr>
-            <p:spPr>
-              <a:xfrm>
-                <a:off x="5789024" y="457200"/>
-                <a:ext cx="3194958" cy="538609"/>
-              </a:xfrm>
-              <a:prstGeom prst="rect">
-                <a:avLst/>
-              </a:prstGeom>
-              <a:noFill/>
-            </p:spPr>
-            <p:txBody>
-              <a:bodyPr wrap="square" rtlCol="0">
-                <a:spAutoFit/>
-              </a:bodyPr>
-              <a:lstStyle/>
-              <a:p>
-                <a:pPr algn="ctr"/>
-                <a:r>
-                  <a:rPr lang="en-US" sz="2900" b="1" dirty="0" smtClean="0">
-                    <a:solidFill>
-                      <a:schemeClr val="bg1">
-                        <a:lumMod val="50000"/>
-                      </a:schemeClr>
-                    </a:solidFill>
-                    <a:latin typeface="Harrington" pitchFamily="82" charset="0"/>
-                  </a:rPr>
-                  <a:t>Talk to me!</a:t>
-                </a:r>
-                <a:endParaRPr lang="en-US" sz="2900" b="1" dirty="0">
-                  <a:solidFill>
-                    <a:schemeClr val="bg1">
-                      <a:lumMod val="50000"/>
-                    </a:schemeClr>
-                  </a:solidFill>
-                  <a:latin typeface="Harrington" pitchFamily="82" charset="0"/>
-                </a:endParaRPr>
-              </a:p>
-            </p:txBody>
-          </p:sp>
-        </p:grpSp>
         <p:sp>
           <p:nvSpPr>
-            <p:cNvPr id="2094" name="Down Arrow 2093"/>
+            <p:cNvPr id="19" name="Cloud Callout 18"/>
             <p:cNvSpPr/>
             <p:nvPr/>
           </p:nvSpPr>
           <p:spPr>
             <a:xfrm>
-              <a:off x="7640973" y="2389885"/>
-              <a:ext cx="391272" cy="998183"/>
+              <a:off x="5250229" y="77163"/>
+              <a:ext cx="3801862" cy="3124200"/>
             </a:xfrm>
-            <a:prstGeom prst="downArrow">
-              <a:avLst/>
+            <a:prstGeom prst="cloudCallout">
+              <a:avLst>
+                <a:gd name="adj1" fmla="val -43346"/>
+                <a:gd name="adj2" fmla="val 12808"/>
+              </a:avLst>
             </a:prstGeom>
             <a:ln>
               <a:solidFill>
                 <a:schemeClr val="bg1"/>
               </a:solidFill>
             </a:ln>
+            <a:effectLst>
+              <a:glow rad="101600">
+                <a:schemeClr val="accent3">
+                  <a:satMod val="175000"/>
+                  <a:alpha val="40000"/>
+                </a:schemeClr>
+              </a:glow>
+              <a:outerShdw blurRad="50800" dist="25400" dir="5400000" rotWithShape="0">
+                <a:srgbClr val="000000">
+                  <a:alpha val="55000"/>
+                </a:srgbClr>
+              </a:outerShdw>
+            </a:effectLst>
           </p:spPr>
           <p:style>
-            <a:lnRef idx="0">
-              <a:schemeClr val="accent5"/>
+            <a:lnRef idx="1">
+              <a:schemeClr val="accent1"/>
             </a:lnRef>
-            <a:fillRef idx="3">
-              <a:schemeClr val="accent5"/>
+            <a:fillRef idx="2">
+              <a:schemeClr val="accent1"/>
             </a:fillRef>
-            <a:effectRef idx="3">
-              <a:schemeClr val="accent5"/>
+            <a:effectRef idx="1">
+              <a:schemeClr val="accent1"/>
             </a:effectRef>
             <a:fontRef idx="minor">
-              <a:schemeClr val="lt1"/>
+              <a:schemeClr val="dk1"/>
             </a:fontRef>
           </p:style>
           <p:txBody>
@@ -7634,196 +7531,20 @@
             <a:lstStyle/>
             <a:p>
               <a:pPr algn="ctr"/>
-              <a:endParaRPr lang="en-US"/>
-            </a:p>
-          </p:txBody>
-        </p:sp>
-        <p:pic>
-          <p:nvPicPr>
-            <p:cNvPr id="2095" name="Picture 42" descr="http://static.freepik.com/free-photo/cartoon-brain-outline-clip-art_411969.jpg"/>
-            <p:cNvPicPr>
-              <a:picLocks noChangeAspect="1" noChangeArrowheads="1"/>
-            </p:cNvPicPr>
-            <p:nvPr/>
-          </p:nvPicPr>
-          <p:blipFill>
-            <a:blip r:embed="rId28" cstate="print">
-              <a:lum bright="70000" contrast="-70000"/>
-              <a:extLst>
-                <a:ext uri="{28A0092B-C50C-407E-A947-70E740481C1C}">
-                  <a14:useLocalDpi xmlns:a14="http://schemas.microsoft.com/office/drawing/2010/main" val="0"/>
-                </a:ext>
-              </a:extLst>
-            </a:blip>
-            <a:srcRect/>
-            <a:stretch>
-              <a:fillRect/>
-            </a:stretch>
-          </p:blipFill>
-          <p:spPr bwMode="auto">
-            <a:xfrm>
-              <a:off x="7217340" y="1077406"/>
-              <a:ext cx="1604588" cy="1312479"/>
-            </a:xfrm>
-            <a:prstGeom prst="rect">
-              <a:avLst/>
-            </a:prstGeom>
-            <a:noFill/>
-            <a:extLst>
-              <a:ext uri="{909E8E84-426E-40DD-AFC4-6F175D3DCCD1}">
-                <a14:hiddenFill xmlns:a14="http://schemas.microsoft.com/office/drawing/2010/main">
-                  <a:solidFill>
-                    <a:srgbClr val="FFFFFF"/>
-                  </a:solidFill>
-                </a14:hiddenFill>
-              </a:ext>
-            </a:extLst>
-          </p:spPr>
-        </p:pic>
-        <p:sp>
-          <p:nvSpPr>
-            <p:cNvPr id="2096" name="Rectangle 2095"/>
-            <p:cNvSpPr/>
-            <p:nvPr/>
-          </p:nvSpPr>
-          <p:spPr>
-            <a:xfrm>
-              <a:off x="7158954" y="1051057"/>
-              <a:ext cx="1671657" cy="1338828"/>
-            </a:xfrm>
-            <a:prstGeom prst="rect">
-              <a:avLst/>
-            </a:prstGeom>
-            <a:noFill/>
-          </p:spPr>
-          <p:txBody>
-            <a:bodyPr wrap="square" lIns="91440" tIns="45720" rIns="91440" bIns="45720">
-              <a:spAutoFit/>
-              <a:scene3d>
-                <a:camera prst="orthographicFront"/>
-                <a:lightRig rig="balanced" dir="t">
-                  <a:rot lat="0" lon="0" rev="2100000"/>
-                </a:lightRig>
-              </a:scene3d>
-              <a:sp3d extrusionH="57150" prstMaterial="metal">
-                <a:bevelT w="38100" h="25400" prst="slope"/>
-                <a:contourClr>
-                  <a:schemeClr val="bg2"/>
-                </a:contourClr>
-              </a:sp3d>
-            </a:bodyPr>
-            <a:lstStyle/>
-            <a:p>
-              <a:pPr algn="ctr"/>
-              <a:r>
-                <a:rPr lang="en-US" sz="2700" b="1" dirty="0" smtClean="0">
-                  <a:ln w="50800"/>
-                  <a:solidFill>
-                    <a:srgbClr val="0000E2"/>
-                  </a:solidFill>
-                </a:rPr>
-                <a:t>Master Control Panel</a:t>
-              </a:r>
-              <a:endParaRPr lang="en-US" sz="2700" b="1" dirty="0">
-                <a:ln w="50800"/>
-                <a:solidFill>
-                  <a:srgbClr val="0000E2"/>
-                </a:solidFill>
-              </a:endParaRPr>
+              <a:endParaRPr lang="en-US" dirty="0"/>
             </a:p>
           </p:txBody>
         </p:sp>
         <p:sp>
           <p:nvSpPr>
-            <p:cNvPr id="2097" name="Round Diagonal Corner Rectangle 2096"/>
-            <p:cNvSpPr/>
-            <p:nvPr/>
-          </p:nvSpPr>
-          <p:spPr>
-            <a:xfrm>
-              <a:off x="5576276" y="995809"/>
-              <a:ext cx="1211151" cy="1470276"/>
-            </a:xfrm>
-            <a:prstGeom prst="round2DiagRect">
-              <a:avLst/>
-            </a:prstGeom>
-          </p:spPr>
-          <p:style>
-            <a:lnRef idx="0">
-              <a:schemeClr val="accent6"/>
-            </a:lnRef>
-            <a:fillRef idx="3">
-              <a:schemeClr val="accent6"/>
-            </a:fillRef>
-            <a:effectRef idx="3">
-              <a:schemeClr val="accent6"/>
-            </a:effectRef>
-            <a:fontRef idx="minor">
-              <a:schemeClr val="lt1"/>
-            </a:fontRef>
-          </p:style>
-          <p:txBody>
-            <a:bodyPr rtlCol="0" anchor="ctr"/>
-            <a:lstStyle/>
-            <a:p>
-              <a:pPr algn="ctr"/>
-              <a:endParaRPr lang="en-US"/>
-            </a:p>
-          </p:txBody>
-        </p:sp>
-        <p:sp>
-          <p:nvSpPr>
-            <p:cNvPr id="138" name="Right Arrow 137"/>
-            <p:cNvSpPr/>
-            <p:nvPr/>
-          </p:nvSpPr>
-          <p:spPr>
-            <a:xfrm>
-              <a:off x="6736685" y="1498602"/>
-              <a:ext cx="599076" cy="376426"/>
-            </a:xfrm>
-            <a:prstGeom prst="rightArrow">
-              <a:avLst/>
-            </a:prstGeom>
-            <a:ln>
-              <a:solidFill>
-                <a:schemeClr val="bg1"/>
-              </a:solidFill>
-            </a:ln>
-          </p:spPr>
-          <p:style>
-            <a:lnRef idx="0">
-              <a:schemeClr val="accent5"/>
-            </a:lnRef>
-            <a:fillRef idx="3">
-              <a:schemeClr val="accent5"/>
-            </a:fillRef>
-            <a:effectRef idx="3">
-              <a:schemeClr val="accent5"/>
-            </a:effectRef>
-            <a:fontRef idx="minor">
-              <a:schemeClr val="lt1"/>
-            </a:fontRef>
-          </p:style>
-          <p:txBody>
-            <a:bodyPr rtlCol="0" anchor="ctr"/>
-            <a:lstStyle/>
-            <a:p>
-              <a:pPr algn="ctr"/>
-              <a:endParaRPr lang="en-US"/>
-            </a:p>
-          </p:txBody>
-        </p:sp>
-        <p:sp>
-          <p:nvSpPr>
-            <p:cNvPr id="2098" name="TextBox 2097"/>
+            <p:cNvPr id="2048" name="TextBox 2047"/>
             <p:cNvSpPr txBox="1"/>
             <p:nvPr/>
           </p:nvSpPr>
           <p:spPr>
             <a:xfrm>
-              <a:off x="5505025" y="1182975"/>
-              <a:ext cx="1357908" cy="646331"/>
+              <a:off x="5789024" y="457200"/>
+              <a:ext cx="3194958" cy="538609"/>
             </a:xfrm>
             <a:prstGeom prst="rect">
               <a:avLst/>
@@ -7838,18 +7559,571 @@
             <a:p>
               <a:pPr algn="ctr"/>
               <a:r>
-                <a:rPr lang="en-US" b="1" dirty="0" smtClean="0">
-                  <a:latin typeface="+mj-lt"/>
+                <a:rPr lang="en-US" sz="2900" b="1" dirty="0" smtClean="0">
+                  <a:solidFill>
+                    <a:schemeClr val="bg1">
+                      <a:lumMod val="50000"/>
+                    </a:schemeClr>
+                  </a:solidFill>
+                  <a:latin typeface="Harrington" pitchFamily="82" charset="0"/>
                 </a:rPr>
-                <a:t>Message Broker</a:t>
+                <a:t>Talk to me!</a:t>
               </a:r>
-              <a:endParaRPr lang="en-US" b="1" dirty="0">
-                <a:latin typeface="+mj-lt"/>
+              <a:endParaRPr lang="en-US" sz="2900" b="1" dirty="0">
+                <a:solidFill>
+                  <a:schemeClr val="bg1">
+                    <a:lumMod val="50000"/>
+                  </a:schemeClr>
+                </a:solidFill>
+                <a:latin typeface="Harrington" pitchFamily="82" charset="0"/>
               </a:endParaRPr>
             </a:p>
           </p:txBody>
         </p:sp>
       </p:grpSp>
+      <p:sp>
+        <p:nvSpPr>
+          <p:cNvPr id="2097" name="Round Diagonal Corner Rectangle 2096"/>
+          <p:cNvSpPr/>
+          <p:nvPr/>
+        </p:nvSpPr>
+        <p:spPr>
+          <a:xfrm>
+            <a:off x="5342049" y="995809"/>
+            <a:ext cx="1211151" cy="1470276"/>
+          </a:xfrm>
+          <a:prstGeom prst="round2DiagRect">
+            <a:avLst/>
+          </a:prstGeom>
+        </p:spPr>
+        <p:style>
+          <a:lnRef idx="0">
+            <a:schemeClr val="accent6"/>
+          </a:lnRef>
+          <a:fillRef idx="3">
+            <a:schemeClr val="accent6"/>
+          </a:fillRef>
+          <a:effectRef idx="3">
+            <a:schemeClr val="accent6"/>
+          </a:effectRef>
+          <a:fontRef idx="minor">
+            <a:schemeClr val="lt1"/>
+          </a:fontRef>
+        </p:style>
+        <p:txBody>
+          <a:bodyPr rtlCol="0" anchor="ctr"/>
+          <a:lstStyle/>
+          <a:p>
+            <a:pPr algn="ctr"/>
+            <a:endParaRPr lang="en-US"/>
+          </a:p>
+        </p:txBody>
+      </p:sp>
+      <p:pic>
+        <p:nvPicPr>
+          <p:cNvPr id="2095" name="Picture 42" descr="http://static.freepik.com/free-photo/cartoon-brain-outline-clip-art_411969.jpg"/>
+          <p:cNvPicPr>
+            <a:picLocks noChangeAspect="1" noChangeArrowheads="1"/>
+          </p:cNvPicPr>
+          <p:nvPr/>
+        </p:nvPicPr>
+        <p:blipFill>
+          <a:blip r:embed="rId28" cstate="print">
+            <a:lum bright="70000" contrast="-70000"/>
+            <a:extLst>
+              <a:ext uri="{28A0092B-C50C-407E-A947-70E740481C1C}">
+                <a14:useLocalDpi xmlns:a14="http://schemas.microsoft.com/office/drawing/2010/main" val="0"/>
+              </a:ext>
+            </a:extLst>
+          </a:blip>
+          <a:srcRect/>
+          <a:stretch>
+            <a:fillRect/>
+          </a:stretch>
+        </p:blipFill>
+        <p:spPr bwMode="auto">
+          <a:xfrm>
+            <a:off x="7010400" y="1077406"/>
+            <a:ext cx="1604588" cy="1312479"/>
+          </a:xfrm>
+          <a:prstGeom prst="rect">
+            <a:avLst/>
+          </a:prstGeom>
+          <a:noFill/>
+          <a:extLst>
+            <a:ext uri="{909E8E84-426E-40DD-AFC4-6F175D3DCCD1}">
+              <a14:hiddenFill xmlns:a14="http://schemas.microsoft.com/office/drawing/2010/main">
+                <a:solidFill>
+                  <a:srgbClr val="FFFFFF"/>
+                </a:solidFill>
+              </a14:hiddenFill>
+            </a:ext>
+          </a:extLst>
+        </p:spPr>
+      </p:pic>
+      <p:sp>
+        <p:nvSpPr>
+          <p:cNvPr id="2098" name="TextBox 2097"/>
+          <p:cNvSpPr txBox="1"/>
+          <p:nvPr/>
+        </p:nvSpPr>
+        <p:spPr>
+          <a:xfrm>
+            <a:off x="5257800" y="1182975"/>
+            <a:ext cx="1357908" cy="646331"/>
+          </a:xfrm>
+          <a:prstGeom prst="rect">
+            <a:avLst/>
+          </a:prstGeom>
+          <a:noFill/>
+        </p:spPr>
+        <p:txBody>
+          <a:bodyPr wrap="square" rtlCol="0">
+            <a:spAutoFit/>
+          </a:bodyPr>
+          <a:lstStyle/>
+          <a:p>
+            <a:pPr algn="ctr"/>
+            <a:r>
+              <a:rPr lang="en-US" b="1" dirty="0" smtClean="0">
+                <a:latin typeface="+mj-lt"/>
+              </a:rPr>
+              <a:t>Message Broker</a:t>
+            </a:r>
+            <a:endParaRPr lang="en-US" b="1" dirty="0">
+              <a:latin typeface="+mj-lt"/>
+            </a:endParaRPr>
+          </a:p>
+        </p:txBody>
+      </p:sp>
+      <p:sp>
+        <p:nvSpPr>
+          <p:cNvPr id="7" name="TextBox 6"/>
+          <p:cNvSpPr txBox="1"/>
+          <p:nvPr/>
+        </p:nvSpPr>
+        <p:spPr>
+          <a:xfrm>
+            <a:off x="6668759" y="2573454"/>
+            <a:ext cx="906530" cy="369332"/>
+          </a:xfrm>
+          <a:prstGeom prst="rect">
+            <a:avLst/>
+          </a:prstGeom>
+          <a:noFill/>
+        </p:spPr>
+        <p:txBody>
+          <a:bodyPr wrap="none" rtlCol="0">
+            <a:spAutoFit/>
+          </a:bodyPr>
+          <a:lstStyle/>
+          <a:p>
+            <a:r>
+              <a:rPr lang="en-US" dirty="0" smtClean="0">
+                <a:solidFill>
+                  <a:schemeClr val="bg2">
+                    <a:lumMod val="75000"/>
+                  </a:schemeClr>
+                </a:solidFill>
+                <a:latin typeface="+mj-lt"/>
+              </a:rPr>
+              <a:t>Azure</a:t>
+            </a:r>
+            <a:endParaRPr lang="en-US" dirty="0">
+              <a:solidFill>
+                <a:schemeClr val="bg2">
+                  <a:lumMod val="75000"/>
+                </a:schemeClr>
+              </a:solidFill>
+              <a:latin typeface="+mj-lt"/>
+            </a:endParaRPr>
+          </a:p>
+        </p:txBody>
+      </p:sp>
+      <p:sp>
+        <p:nvSpPr>
+          <p:cNvPr id="8" name="TextBox 7"/>
+          <p:cNvSpPr txBox="1"/>
+          <p:nvPr/>
+        </p:nvSpPr>
+        <p:spPr>
+          <a:xfrm>
+            <a:off x="5562600" y="2067174"/>
+            <a:ext cx="780085" cy="276999"/>
+          </a:xfrm>
+          <a:prstGeom prst="rect">
+            <a:avLst/>
+          </a:prstGeom>
+          <a:noFill/>
+        </p:spPr>
+        <p:txBody>
+          <a:bodyPr wrap="none" rtlCol="0">
+            <a:spAutoFit/>
+          </a:bodyPr>
+          <a:lstStyle/>
+          <a:p>
+            <a:r>
+              <a:rPr lang="en-US" sz="1200" dirty="0" smtClean="0">
+                <a:solidFill>
+                  <a:schemeClr val="bg1"/>
+                </a:solidFill>
+                <a:latin typeface="+mj-lt"/>
+              </a:rPr>
+              <a:t>Worker</a:t>
+            </a:r>
+            <a:endParaRPr lang="en-US" sz="1200" dirty="0">
+              <a:solidFill>
+                <a:schemeClr val="bg1"/>
+              </a:solidFill>
+              <a:latin typeface="+mj-lt"/>
+            </a:endParaRPr>
+          </a:p>
+        </p:txBody>
+      </p:sp>
+      <p:sp>
+        <p:nvSpPr>
+          <p:cNvPr id="2096" name="Rectangle 2095"/>
+          <p:cNvSpPr/>
+          <p:nvPr/>
+        </p:nvSpPr>
+        <p:spPr>
+          <a:xfrm>
+            <a:off x="6934200" y="1051057"/>
+            <a:ext cx="1671657" cy="646331"/>
+          </a:xfrm>
+          <a:prstGeom prst="rect">
+            <a:avLst/>
+          </a:prstGeom>
+          <a:noFill/>
+        </p:spPr>
+        <p:txBody>
+          <a:bodyPr wrap="square" lIns="91440" tIns="45720" rIns="91440" bIns="45720">
+            <a:spAutoFit/>
+            <a:scene3d>
+              <a:camera prst="orthographicFront"/>
+              <a:lightRig rig="balanced" dir="t">
+                <a:rot lat="0" lon="0" rev="2100000"/>
+              </a:lightRig>
+            </a:scene3d>
+            <a:sp3d extrusionH="57150" prstMaterial="metal">
+              <a:bevelT w="38100" h="25400" prst="slope"/>
+              <a:contourClr>
+                <a:schemeClr val="bg2"/>
+              </a:contourClr>
+            </a:sp3d>
+          </a:bodyPr>
+          <a:lstStyle/>
+          <a:p>
+            <a:pPr algn="ctr"/>
+            <a:r>
+              <a:rPr lang="en-US" b="1" dirty="0" smtClean="0">
+                <a:ln w="50800"/>
+                <a:solidFill>
+                  <a:srgbClr val="0000E2"/>
+                </a:solidFill>
+              </a:rPr>
+              <a:t>Master Control Panel</a:t>
+            </a:r>
+            <a:endParaRPr lang="en-US" b="1" dirty="0">
+              <a:ln w="50800"/>
+              <a:solidFill>
+                <a:srgbClr val="0000E2"/>
+              </a:solidFill>
+            </a:endParaRPr>
+          </a:p>
+        </p:txBody>
+      </p:sp>
+      <p:sp>
+        <p:nvSpPr>
+          <p:cNvPr id="85" name="TextBox 84"/>
+          <p:cNvSpPr txBox="1"/>
+          <p:nvPr/>
+        </p:nvSpPr>
+        <p:spPr>
+          <a:xfrm>
+            <a:off x="8032245" y="2067173"/>
+            <a:ext cx="538289" cy="276999"/>
+          </a:xfrm>
+          <a:prstGeom prst="rect">
+            <a:avLst/>
+          </a:prstGeom>
+          <a:noFill/>
+        </p:spPr>
+        <p:txBody>
+          <a:bodyPr wrap="none" rtlCol="0">
+            <a:spAutoFit/>
+          </a:bodyPr>
+          <a:lstStyle/>
+          <a:p>
+            <a:r>
+              <a:rPr lang="en-US" sz="1200" dirty="0" smtClean="0">
+                <a:solidFill>
+                  <a:schemeClr val="bg1"/>
+                </a:solidFill>
+                <a:latin typeface="+mj-lt"/>
+              </a:rPr>
+              <a:t>Web</a:t>
+            </a:r>
+            <a:endParaRPr lang="en-US" sz="1200" dirty="0">
+              <a:solidFill>
+                <a:schemeClr val="bg1"/>
+              </a:solidFill>
+              <a:latin typeface="+mj-lt"/>
+            </a:endParaRPr>
+          </a:p>
+        </p:txBody>
+      </p:sp>
+      <p:sp>
+        <p:nvSpPr>
+          <p:cNvPr id="86" name="Rectangle 85"/>
+          <p:cNvSpPr/>
+          <p:nvPr/>
+        </p:nvSpPr>
+        <p:spPr>
+          <a:xfrm>
+            <a:off x="5196264" y="6009445"/>
+            <a:ext cx="3448301" cy="369332"/>
+          </a:xfrm>
+          <a:prstGeom prst="rect">
+            <a:avLst/>
+          </a:prstGeom>
+          <a:noFill/>
+        </p:spPr>
+        <p:txBody>
+          <a:bodyPr wrap="square" lIns="91440" tIns="45720" rIns="91440" bIns="45720">
+            <a:spAutoFit/>
+            <a:scene3d>
+              <a:camera prst="orthographicFront"/>
+              <a:lightRig rig="balanced" dir="t">
+                <a:rot lat="0" lon="0" rev="2100000"/>
+              </a:lightRig>
+            </a:scene3d>
+            <a:sp3d extrusionH="57150" prstMaterial="metal">
+              <a:bevelT w="38100" h="25400" prst="slope"/>
+              <a:contourClr>
+                <a:schemeClr val="bg2"/>
+              </a:contourClr>
+            </a:sp3d>
+          </a:bodyPr>
+          <a:lstStyle/>
+          <a:p>
+            <a:pPr algn="ctr"/>
+            <a:r>
+              <a:rPr lang="en-US" b="1" dirty="0" smtClean="0">
+                <a:ln w="50800"/>
+                <a:solidFill>
+                  <a:srgbClr val="0000E2"/>
+                </a:solidFill>
+              </a:rPr>
+              <a:t>Master Control </a:t>
+            </a:r>
+            <a:r>
+              <a:rPr lang="en-US" b="1" dirty="0" smtClean="0">
+                <a:ln w="50800"/>
+                <a:solidFill>
+                  <a:srgbClr val="0000E2"/>
+                </a:solidFill>
+              </a:rPr>
+              <a:t>Panel Dashboard</a:t>
+            </a:r>
+            <a:endParaRPr lang="en-US" b="1" dirty="0">
+              <a:ln w="50800"/>
+              <a:solidFill>
+                <a:srgbClr val="0000E2"/>
+              </a:solidFill>
+            </a:endParaRPr>
+          </a:p>
+        </p:txBody>
+      </p:sp>
+      <p:sp>
+        <p:nvSpPr>
+          <p:cNvPr id="90" name="Left-Right Arrow 89"/>
+          <p:cNvSpPr/>
+          <p:nvPr/>
+        </p:nvSpPr>
+        <p:spPr>
+          <a:xfrm rot="19438549">
+            <a:off x="4029398" y="2615843"/>
+            <a:ext cx="1541742" cy="290281"/>
+          </a:xfrm>
+          <a:prstGeom prst="leftRightArrow">
+            <a:avLst/>
+          </a:prstGeom>
+          <a:gradFill flip="none" rotWithShape="1">
+            <a:gsLst>
+              <a:gs pos="0">
+                <a:srgbClr val="03D4A8"/>
+              </a:gs>
+              <a:gs pos="25000">
+                <a:srgbClr val="21D6E0"/>
+              </a:gs>
+              <a:gs pos="75000">
+                <a:srgbClr val="0087E6"/>
+              </a:gs>
+              <a:gs pos="100000">
+                <a:srgbClr val="005CBF"/>
+              </a:gs>
+            </a:gsLst>
+            <a:lin ang="5400000" scaled="1"/>
+            <a:tileRect/>
+          </a:gradFill>
+          <a:ln>
+            <a:solidFill>
+              <a:schemeClr val="accent1"/>
+            </a:solidFill>
+          </a:ln>
+        </p:spPr>
+        <p:style>
+          <a:lnRef idx="2">
+            <a:schemeClr val="accent1">
+              <a:shade val="50000"/>
+            </a:schemeClr>
+          </a:lnRef>
+          <a:fillRef idx="1">
+            <a:schemeClr val="accent1"/>
+          </a:fillRef>
+          <a:effectRef idx="0">
+            <a:schemeClr val="accent1"/>
+          </a:effectRef>
+          <a:fontRef idx="minor">
+            <a:schemeClr val="lt1"/>
+          </a:fontRef>
+        </p:style>
+        <p:txBody>
+          <a:bodyPr rtlCol="0" anchor="ctr"/>
+          <a:lstStyle/>
+          <a:p>
+            <a:pPr algn="ctr"/>
+            <a:endParaRPr lang="en-US"/>
+          </a:p>
+        </p:txBody>
+      </p:sp>
+      <p:sp>
+        <p:nvSpPr>
+          <p:cNvPr id="95" name="Left-Right Arrow 94"/>
+          <p:cNvSpPr/>
+          <p:nvPr/>
+        </p:nvSpPr>
+        <p:spPr>
+          <a:xfrm>
+            <a:off x="6491111" y="1776893"/>
+            <a:ext cx="630913" cy="290281"/>
+          </a:xfrm>
+          <a:prstGeom prst="leftRightArrow">
+            <a:avLst/>
+          </a:prstGeom>
+          <a:gradFill flip="none" rotWithShape="1">
+            <a:gsLst>
+              <a:gs pos="0">
+                <a:srgbClr val="03D4A8"/>
+              </a:gs>
+              <a:gs pos="25000">
+                <a:srgbClr val="21D6E0"/>
+              </a:gs>
+              <a:gs pos="75000">
+                <a:srgbClr val="0087E6"/>
+              </a:gs>
+              <a:gs pos="100000">
+                <a:srgbClr val="005CBF"/>
+              </a:gs>
+            </a:gsLst>
+            <a:lin ang="5400000" scaled="1"/>
+            <a:tileRect/>
+          </a:gradFill>
+          <a:ln>
+            <a:solidFill>
+              <a:schemeClr val="accent1"/>
+            </a:solidFill>
+          </a:ln>
+        </p:spPr>
+        <p:style>
+          <a:lnRef idx="2">
+            <a:schemeClr val="accent1">
+              <a:shade val="50000"/>
+            </a:schemeClr>
+          </a:lnRef>
+          <a:fillRef idx="1">
+            <a:schemeClr val="accent1"/>
+          </a:fillRef>
+          <a:effectRef idx="0">
+            <a:schemeClr val="accent1"/>
+          </a:effectRef>
+          <a:fontRef idx="minor">
+            <a:schemeClr val="lt1"/>
+          </a:fontRef>
+        </p:style>
+        <p:txBody>
+          <a:bodyPr rtlCol="0" anchor="ctr"/>
+          <a:lstStyle/>
+          <a:p>
+            <a:pPr algn="ctr"/>
+            <a:endParaRPr lang="en-US"/>
+          </a:p>
+        </p:txBody>
+      </p:sp>
+      <p:sp>
+        <p:nvSpPr>
+          <p:cNvPr id="96" name="Left-Right Arrow 95"/>
+          <p:cNvSpPr/>
+          <p:nvPr/>
+        </p:nvSpPr>
+        <p:spPr>
+          <a:xfrm rot="5400000">
+            <a:off x="7351831" y="2654017"/>
+            <a:ext cx="1186970" cy="290281"/>
+          </a:xfrm>
+          <a:prstGeom prst="leftRightArrow">
+            <a:avLst/>
+          </a:prstGeom>
+          <a:gradFill flip="none" rotWithShape="1">
+            <a:gsLst>
+              <a:gs pos="0">
+                <a:srgbClr val="03D4A8"/>
+              </a:gs>
+              <a:gs pos="25000">
+                <a:srgbClr val="21D6E0"/>
+              </a:gs>
+              <a:gs pos="75000">
+                <a:srgbClr val="0087E6"/>
+              </a:gs>
+              <a:gs pos="100000">
+                <a:srgbClr val="005CBF"/>
+              </a:gs>
+            </a:gsLst>
+            <a:lin ang="5400000" scaled="1"/>
+            <a:tileRect/>
+          </a:gradFill>
+          <a:ln>
+            <a:solidFill>
+              <a:schemeClr val="accent1"/>
+            </a:solidFill>
+          </a:ln>
+        </p:spPr>
+        <p:style>
+          <a:lnRef idx="2">
+            <a:schemeClr val="accent1">
+              <a:shade val="50000"/>
+            </a:schemeClr>
+          </a:lnRef>
+          <a:fillRef idx="1">
+            <a:schemeClr val="accent1"/>
+          </a:fillRef>
+          <a:effectRef idx="0">
+            <a:schemeClr val="accent1"/>
+          </a:effectRef>
+          <a:fontRef idx="minor">
+            <a:schemeClr val="lt1"/>
+          </a:fontRef>
+        </p:style>
+        <p:txBody>
+          <a:bodyPr rtlCol="0" anchor="ctr"/>
+          <a:lstStyle/>
+          <a:p>
+            <a:pPr algn="ctr"/>
+            <a:endParaRPr lang="en-US"/>
+          </a:p>
+        </p:txBody>
+      </p:sp>
     </p:spTree>
     <p:extLst>
       <p:ext uri="{BB962C8B-B14F-4D97-AF65-F5344CB8AC3E}">

</xml_diff>